<commit_message>
Addedin the LOTSwitch to iOS
</commit_message>
<xml_diff>
--- a/Presentation.pptx
+++ b/Presentation.pptx
@@ -8,16 +8,19 @@
     <p:sldId id="256" r:id="rId2"/>
     <p:sldId id="257" r:id="rId3"/>
     <p:sldId id="258" r:id="rId4"/>
-    <p:sldId id="261" r:id="rId5"/>
-    <p:sldId id="259" r:id="rId6"/>
-    <p:sldId id="260" r:id="rId7"/>
-    <p:sldId id="263" r:id="rId8"/>
-    <p:sldId id="262" r:id="rId9"/>
-    <p:sldId id="264" r:id="rId10"/>
-    <p:sldId id="265" r:id="rId11"/>
-    <p:sldId id="266" r:id="rId12"/>
-    <p:sldId id="267" r:id="rId13"/>
-    <p:sldId id="268" r:id="rId14"/>
+    <p:sldId id="270" r:id="rId5"/>
+    <p:sldId id="269" r:id="rId6"/>
+    <p:sldId id="261" r:id="rId7"/>
+    <p:sldId id="271" r:id="rId8"/>
+    <p:sldId id="259" r:id="rId9"/>
+    <p:sldId id="260" r:id="rId10"/>
+    <p:sldId id="263" r:id="rId11"/>
+    <p:sldId id="262" r:id="rId12"/>
+    <p:sldId id="264" r:id="rId13"/>
+    <p:sldId id="265" r:id="rId14"/>
+    <p:sldId id="266" r:id="rId15"/>
+    <p:sldId id="267" r:id="rId16"/>
+    <p:sldId id="268" r:id="rId17"/>
   </p:sldIdLst>
   <p:sldSz cx="12192000" cy="6858000"/>
   <p:notesSz cx="6858000" cy="9144000"/>
@@ -116,6 +119,11 @@
       </a:defRPr>
     </a:lvl9pPr>
   </p:defaultTextStyle>
+  <p:extLst>
+    <p:ext uri="{EFAFB233-063F-42B5-8137-9DF3F51BA10A}">
+      <p15:sldGuideLst xmlns:p15="http://schemas.microsoft.com/office/powerpoint/2012/main"/>
+    </p:ext>
+  </p:extLst>
 </p:presentation>
 </file>
 
@@ -214,7 +222,7 @@
           <a:effectLst/>
           <a:extLst>
             <a:ext uri="{91240B29-F687-4f45-9708-019B960494DF}">
-              <a14:hiddenLine xmlns:a14="http://schemas.microsoft.com/office/drawing/2010/main" xmlns="" w="9525">
+              <a14:hiddenLine xmlns="" xmlns:a14="http://schemas.microsoft.com/office/drawing/2010/main" w="9525">
                 <a:solidFill>
                   <a:srgbClr val="000000"/>
                 </a:solidFill>
@@ -407,7 +415,7 @@
             <a:fld id="{08B9EBBA-996F-894A-B54A-D6246ED52CEA}" type="datetimeFigureOut">
               <a:rPr lang="en-US" dirty="0"/>
               <a:pPr/>
-              <a:t>5/24/18</a:t>
+              <a:t>5/29/18</a:t>
             </a:fld>
             <a:endParaRPr lang="en-US" dirty="0"/>
           </a:p>
@@ -722,7 +730,7 @@
             <a:fld id="{18C79C5D-2A6F-F04D-97DA-BEF2467B64E4}" type="datetimeFigureOut">
               <a:rPr lang="en-US" dirty="0"/>
               <a:pPr/>
-              <a:t>5/24/18</a:t>
+              <a:t>5/29/18</a:t>
             </a:fld>
             <a:endParaRPr lang="en-US" dirty="0"/>
           </a:p>
@@ -1207,7 +1215,7 @@
             <a:fld id="{8DFA1846-DA80-1C48-A609-854EA85C59AD}" type="datetimeFigureOut">
               <a:rPr lang="en-US" dirty="0"/>
               <a:pPr/>
-              <a:t>5/24/18</a:t>
+              <a:t>5/29/18</a:t>
             </a:fld>
             <a:endParaRPr lang="en-US" dirty="0"/>
           </a:p>
@@ -1573,7 +1581,7 @@
             <a:fld id="{FBF54567-0DE4-3F47-BF90-CB84690072F9}" type="datetimeFigureOut">
               <a:rPr lang="en-US" dirty="0"/>
               <a:pPr/>
-              <a:t>5/24/18</a:t>
+              <a:t>5/29/18</a:t>
             </a:fld>
             <a:endParaRPr lang="en-US" dirty="0"/>
           </a:p>
@@ -1724,7 +1732,7 @@
           <a:ln/>
           <a:extLst>
             <a:ext uri="{91240B29-F687-4f45-9708-019B960494DF}">
-              <a14:hiddenLine xmlns:a14="http://schemas.microsoft.com/office/drawing/2010/main" xmlns="" w="9525">
+              <a14:hiddenLine xmlns="" xmlns:a14="http://schemas.microsoft.com/office/drawing/2010/main" w="9525">
                 <a:solidFill>
                   <a:srgbClr val="000000"/>
                 </a:solidFill>
@@ -1843,7 +1851,7 @@
             <a:fld id="{C6C52C72-DE31-F449-A4ED-4C594FD91407}" type="datetimeFigureOut">
               <a:rPr lang="en-US" dirty="0"/>
               <a:pPr/>
-              <a:t>5/24/18</a:t>
+              <a:t>5/29/18</a:t>
             </a:fld>
             <a:endParaRPr lang="en-US" dirty="0"/>
           </a:p>
@@ -1996,7 +2004,7 @@
           <a:ln/>
           <a:extLst>
             <a:ext uri="{91240B29-F687-4f45-9708-019B960494DF}">
-              <a14:hiddenLine xmlns:a14="http://schemas.microsoft.com/office/drawing/2010/main" xmlns="" w="9525">
+              <a14:hiddenLine xmlns="" xmlns:a14="http://schemas.microsoft.com/office/drawing/2010/main" w="9525">
                 <a:solidFill>
                   <a:srgbClr val="000000"/>
                 </a:solidFill>
@@ -2125,7 +2133,7 @@
             <a:fld id="{ED62726E-379B-B349-9EED-81ED093FA806}" type="datetimeFigureOut">
               <a:rPr lang="en-US" dirty="0"/>
               <a:pPr/>
-              <a:t>5/24/18</a:t>
+              <a:t>5/29/18</a:t>
             </a:fld>
             <a:endParaRPr lang="en-US" dirty="0"/>
           </a:p>
@@ -2276,7 +2284,7 @@
           <a:ln/>
           <a:extLst>
             <a:ext uri="{91240B29-F687-4f45-9708-019B960494DF}">
-              <a14:hiddenLine xmlns:a14="http://schemas.microsoft.com/office/drawing/2010/main" xmlns="" w="9525">
+              <a14:hiddenLine xmlns="" xmlns:a14="http://schemas.microsoft.com/office/drawing/2010/main" w="9525">
                 <a:solidFill>
                   <a:srgbClr val="000000"/>
                 </a:solidFill>
@@ -2405,7 +2413,7 @@
             <a:fld id="{9B3A1323-8D79-1946-B0D7-40001CF92E9D}" type="datetimeFigureOut">
               <a:rPr lang="en-US" dirty="0"/>
               <a:pPr/>
-              <a:t>5/24/18</a:t>
+              <a:t>5/29/18</a:t>
             </a:fld>
             <a:endParaRPr lang="en-US" dirty="0"/>
           </a:p>
@@ -2745,7 +2753,7 @@
             <a:fld id="{8DFA1846-DA80-1C48-A609-854EA85C59AD}" type="datetimeFigureOut">
               <a:rPr lang="en-US" dirty="0"/>
               <a:pPr/>
-              <a:t>5/24/18</a:t>
+              <a:t>5/29/18</a:t>
             </a:fld>
             <a:endParaRPr lang="en-US" dirty="0"/>
           </a:p>
@@ -2896,7 +2904,7 @@
           <a:ln/>
           <a:extLst>
             <a:ext uri="{91240B29-F687-4f45-9708-019B960494DF}">
-              <a14:hiddenLine xmlns:a14="http://schemas.microsoft.com/office/drawing/2010/main" xmlns="" w="9525">
+              <a14:hiddenLine xmlns="" xmlns:a14="http://schemas.microsoft.com/office/drawing/2010/main" w="9525">
                 <a:solidFill>
                   <a:srgbClr val="000000"/>
                 </a:solidFill>
@@ -3081,7 +3089,7 @@
             <a:fld id="{57302355-E14B-8545-A8F8-0FE83CC9D524}" type="datetimeFigureOut">
               <a:rPr lang="en-US" dirty="0"/>
               <a:pPr/>
-              <a:t>5/24/18</a:t>
+              <a:t>5/29/18</a:t>
             </a:fld>
             <a:endParaRPr lang="en-US" dirty="0"/>
           </a:p>
@@ -3232,7 +3240,7 @@
           <a:ln/>
           <a:extLst>
             <a:ext uri="{91240B29-F687-4f45-9708-019B960494DF}">
-              <a14:hiddenLine xmlns:a14="http://schemas.microsoft.com/office/drawing/2010/main" xmlns="" w="9525">
+              <a14:hiddenLine xmlns="" xmlns:a14="http://schemas.microsoft.com/office/drawing/2010/main" w="9525">
                 <a:solidFill>
                   <a:srgbClr val="000000"/>
                 </a:solidFill>
@@ -3555,7 +3563,7 @@
             <a:fld id="{02640F58-564D-2B4F-AE67-E407BA4FCF45}" type="datetimeFigureOut">
               <a:rPr lang="en-US" dirty="0"/>
               <a:pPr/>
-              <a:t>5/24/18</a:t>
+              <a:t>5/29/18</a:t>
             </a:fld>
             <a:endParaRPr lang="en-US" dirty="0"/>
           </a:p>
@@ -3706,7 +3714,7 @@
           <a:ln/>
           <a:extLst>
             <a:ext uri="{91240B29-F687-4f45-9708-019B960494DF}">
-              <a14:hiddenLine xmlns:a14="http://schemas.microsoft.com/office/drawing/2010/main" xmlns="" w="9525">
+              <a14:hiddenLine xmlns="" xmlns:a14="http://schemas.microsoft.com/office/drawing/2010/main" w="9525">
                 <a:solidFill>
                   <a:srgbClr val="000000"/>
                 </a:solidFill>
@@ -3773,7 +3781,7 @@
             <a:fld id="{F13A34C8-038E-2045-AF43-DF7DBB8E0E9E}" type="datetimeFigureOut">
               <a:rPr lang="en-US" dirty="0"/>
               <a:pPr/>
-              <a:t>5/24/18</a:t>
+              <a:t>5/29/18</a:t>
             </a:fld>
             <a:endParaRPr lang="en-US" dirty="0"/>
           </a:p>
@@ -3865,7 +3873,7 @@
             <a:fld id="{8818C68F-D26B-8F47-958C-23B49CF8A634}" type="datetimeFigureOut">
               <a:rPr lang="en-US" dirty="0"/>
               <a:pPr/>
-              <a:t>5/24/18</a:t>
+              <a:t>5/29/18</a:t>
             </a:fld>
             <a:endParaRPr lang="en-US" dirty="0"/>
           </a:p>
@@ -4129,7 +4137,7 @@
           <a:ln/>
           <a:extLst>
             <a:ext uri="{91240B29-F687-4f45-9708-019B960494DF}">
-              <a14:hiddenLine xmlns:a14="http://schemas.microsoft.com/office/drawing/2010/main" xmlns="" w="9525">
+              <a14:hiddenLine xmlns="" xmlns:a14="http://schemas.microsoft.com/office/drawing/2010/main" w="9525">
                 <a:solidFill>
                   <a:srgbClr val="000000"/>
                 </a:solidFill>
@@ -4329,7 +4337,7 @@
             <a:fld id="{D0DF5E60-9974-AC48-9591-99C2BB44B7CF}" type="datetimeFigureOut">
               <a:rPr lang="en-US" dirty="0"/>
               <a:pPr/>
-              <a:t>5/24/18</a:t>
+              <a:t>5/29/18</a:t>
             </a:fld>
             <a:endParaRPr lang="en-US" dirty="0"/>
           </a:p>
@@ -4639,7 +4647,7 @@
             <a:fld id="{18C79C5D-2A6F-F04D-97DA-BEF2467B64E4}" type="datetimeFigureOut">
               <a:rPr lang="en-US" dirty="0"/>
               <a:pPr/>
-              <a:t>5/24/18</a:t>
+              <a:t>5/29/18</a:t>
             </a:fld>
             <a:endParaRPr lang="en-US" dirty="0"/>
           </a:p>
@@ -4906,7 +4914,7 @@
             <a:fld id="{09B482E8-6E0E-1B4F-B1FD-C69DB9E858D9}" type="datetimeFigureOut">
               <a:rPr lang="en-US" dirty="0"/>
               <a:pPr/>
-              <a:t>5/24/18</a:t>
+              <a:t>5/29/18</a:t>
             </a:fld>
             <a:endParaRPr lang="en-US" dirty="0"/>
           </a:p>
@@ -5465,7 +5473,7 @@
           <p:cNvPr id="2" name="Title 1">
             <a:extLst>
               <a:ext uri="{FF2B5EF4-FFF2-40B4-BE49-F238E27FC236}">
-                <a16:creationId xmlns:a16="http://schemas.microsoft.com/office/drawing/2014/main" id="{8B9970EC-88F5-6F41-AC6A-BFE9DB53B82D}"/>
+                <a16:creationId xmlns:a16="http://schemas.microsoft.com/office/drawing/2014/main" id="{B2BC51A3-59A3-1248-8ADD-32DE10087C83}"/>
               </a:ext>
             </a:extLst>
           </p:cNvPr>
@@ -5482,9 +5490,10 @@
           <a:lstStyle/>
           <a:p>
             <a:r>
-              <a:rPr lang="en-US" dirty="0"/>
-              <a:t>After Effects demonstration</a:t>
-            </a:r>
+              <a:rPr lang="en-US" dirty="0" err="1"/>
+              <a:t>LottieFiles.com</a:t>
+            </a:r>
+            <a:endParaRPr lang="en-US" dirty="0"/>
           </a:p>
         </p:txBody>
       </p:sp>
@@ -5493,7 +5502,7 @@
           <p:cNvPr id="3" name="Content Placeholder 2">
             <a:extLst>
               <a:ext uri="{FF2B5EF4-FFF2-40B4-BE49-F238E27FC236}">
-                <a16:creationId xmlns:a16="http://schemas.microsoft.com/office/drawing/2014/main" id="{14DEE059-64FC-D24B-AF07-17F473784256}"/>
+                <a16:creationId xmlns:a16="http://schemas.microsoft.com/office/drawing/2014/main" id="{1E9584BD-2512-D143-AC12-F46B728C7C8C}"/>
               </a:ext>
             </a:extLst>
           </p:cNvPr>
@@ -5511,7 +5520,15 @@
           <a:p>
             <a:r>
               <a:rPr lang="en-US" dirty="0"/>
-              <a:t>Show how the designer workflow is and how to export (I’ll provide like a 5m video narrated by my designer)</a:t>
+              <a:t>Show all the cool </a:t>
+            </a:r>
+            <a:r>
+              <a:rPr lang="en-US" dirty="0" err="1"/>
+              <a:t>anims</a:t>
+            </a:r>
+            <a:r>
+              <a:rPr lang="en-US" dirty="0"/>
+              <a:t> you can use for free, lead into demo</a:t>
             </a:r>
           </a:p>
         </p:txBody>
@@ -5519,7 +5536,7 @@
     </p:spTree>
     <p:extLst>
       <p:ext uri="{BB962C8B-B14F-4D97-AF65-F5344CB8AC3E}">
-        <p14:creationId xmlns:p14="http://schemas.microsoft.com/office/powerpoint/2010/main" val="2553079952"/>
+        <p14:creationId xmlns:p14="http://schemas.microsoft.com/office/powerpoint/2010/main" val="3992220478"/>
       </p:ext>
     </p:extLst>
   </p:cSld>
@@ -5551,7 +5568,7 @@
           <p:cNvPr id="2" name="Title 1">
             <a:extLst>
               <a:ext uri="{FF2B5EF4-FFF2-40B4-BE49-F238E27FC236}">
-                <a16:creationId xmlns:a16="http://schemas.microsoft.com/office/drawing/2014/main" id="{9F22C05D-6C88-904D-9795-DF3F11BB3B0B}"/>
+                <a16:creationId xmlns:a16="http://schemas.microsoft.com/office/drawing/2014/main" id="{22CD9F90-8D25-8446-82C1-122E31FCE7C8}"/>
               </a:ext>
             </a:extLst>
           </p:cNvPr>
@@ -5568,10 +5585,9 @@
           <a:lstStyle/>
           <a:p>
             <a:r>
-              <a:rPr lang="en-US" dirty="0" err="1"/>
-              <a:t>MultiPlat</a:t>
-            </a:r>
-            <a:endParaRPr lang="en-US" dirty="0"/>
+              <a:rPr lang="en-US" dirty="0"/>
+              <a:t>Demo</a:t>
+            </a:r>
           </a:p>
         </p:txBody>
       </p:sp>
@@ -5580,7 +5596,7 @@
           <p:cNvPr id="3" name="Content Placeholder 2">
             <a:extLst>
               <a:ext uri="{FF2B5EF4-FFF2-40B4-BE49-F238E27FC236}">
-                <a16:creationId xmlns:a16="http://schemas.microsoft.com/office/drawing/2014/main" id="{0E961F4C-4437-1841-8378-85CA3B3665A2}"/>
+                <a16:creationId xmlns:a16="http://schemas.microsoft.com/office/drawing/2014/main" id="{C08951B8-8818-1F45-B5C3-F37F80C3BF1E}"/>
               </a:ext>
             </a:extLst>
           </p:cNvPr>
@@ -5598,23 +5614,32 @@
           <a:p>
             <a:r>
               <a:rPr lang="en-US" dirty="0"/>
-              <a:t>Show the </a:t>
+              <a:t>Show web </a:t>
             </a:r>
             <a:r>
               <a:rPr lang="en-US" dirty="0" err="1"/>
-              <a:t>Xamarin.iOS</a:t>
-            </a:r>
-            <a:r>
-              <a:rPr lang="en-US" dirty="0"/>
-              <a:t> and </a:t>
+              <a:t>anim</a:t>
+            </a:r>
+            <a:endParaRPr lang="en-US" dirty="0"/>
+          </a:p>
+          <a:p>
+            <a:r>
+              <a:rPr lang="en-US" dirty="0"/>
+              <a:t>Then show same </a:t>
             </a:r>
             <a:r>
               <a:rPr lang="en-US" dirty="0" err="1"/>
-              <a:t>Xamarin.Android</a:t>
-            </a:r>
-            <a:r>
-              <a:rPr lang="en-US" dirty="0"/>
-              <a:t> stuff</a:t>
+              <a:t>anim</a:t>
+            </a:r>
+            <a:r>
+              <a:rPr lang="en-US" dirty="0"/>
+              <a:t> loading in a simulator</a:t>
+            </a:r>
+          </a:p>
+          <a:p>
+            <a:r>
+              <a:rPr lang="en-US" dirty="0"/>
+              <a:t>Show loading from URL and from Bundle (code next to simulator open)</a:t>
             </a:r>
           </a:p>
         </p:txBody>
@@ -5622,7 +5647,7 @@
     </p:spTree>
     <p:extLst>
       <p:ext uri="{BB962C8B-B14F-4D97-AF65-F5344CB8AC3E}">
-        <p14:creationId xmlns:p14="http://schemas.microsoft.com/office/powerpoint/2010/main" val="2484938975"/>
+        <p14:creationId xmlns:p14="http://schemas.microsoft.com/office/powerpoint/2010/main" val="4099766690"/>
       </p:ext>
     </p:extLst>
   </p:cSld>
@@ -5654,6 +5679,281 @@
           <p:cNvPr id="2" name="Title 1">
             <a:extLst>
               <a:ext uri="{FF2B5EF4-FFF2-40B4-BE49-F238E27FC236}">
+                <a16:creationId xmlns:a16="http://schemas.microsoft.com/office/drawing/2014/main" id="{FE0902FC-4496-8640-BD19-242A7877A5C8}"/>
+              </a:ext>
+            </a:extLst>
+          </p:cNvPr>
+          <p:cNvSpPr>
+            <a:spLocks noGrp="1"/>
+          </p:cNvSpPr>
+          <p:nvPr>
+            <p:ph type="title"/>
+          </p:nvPr>
+        </p:nvSpPr>
+        <p:spPr/>
+        <p:txBody>
+          <a:bodyPr/>
+          <a:lstStyle/>
+          <a:p>
+            <a:r>
+              <a:rPr lang="en-US" dirty="0"/>
+              <a:t>SDK Advanced</a:t>
+            </a:r>
+          </a:p>
+        </p:txBody>
+      </p:sp>
+      <p:sp>
+        <p:nvSpPr>
+          <p:cNvPr id="3" name="Content Placeholder 2">
+            <a:extLst>
+              <a:ext uri="{FF2B5EF4-FFF2-40B4-BE49-F238E27FC236}">
+                <a16:creationId xmlns:a16="http://schemas.microsoft.com/office/drawing/2014/main" id="{D79193F6-90C9-E441-A41B-1DF2BF949281}"/>
+              </a:ext>
+            </a:extLst>
+          </p:cNvPr>
+          <p:cNvSpPr>
+            <a:spLocks noGrp="1"/>
+          </p:cNvSpPr>
+          <p:nvPr>
+            <p:ph idx="1"/>
+          </p:nvPr>
+        </p:nvSpPr>
+        <p:spPr/>
+        <p:txBody>
+          <a:bodyPr/>
+          <a:lstStyle/>
+          <a:p>
+            <a:r>
+              <a:rPr lang="en-US" dirty="0"/>
+              <a:t>Easing, transitions, forward/backward stuff</a:t>
+            </a:r>
+          </a:p>
+        </p:txBody>
+      </p:sp>
+    </p:spTree>
+    <p:extLst>
+      <p:ext uri="{BB962C8B-B14F-4D97-AF65-F5344CB8AC3E}">
+        <p14:creationId xmlns:p14="http://schemas.microsoft.com/office/powerpoint/2010/main" val="4050406585"/>
+      </p:ext>
+    </p:extLst>
+  </p:cSld>
+  <p:clrMapOvr>
+    <a:masterClrMapping/>
+  </p:clrMapOvr>
+</p:sld>
+</file>
+
+<file path=ppt/slides/slide13.xml><?xml version="1.0" encoding="utf-8"?>
+<p:sld xmlns:a="http://schemas.openxmlformats.org/drawingml/2006/main" xmlns:r="http://schemas.openxmlformats.org/officeDocument/2006/relationships" xmlns:p="http://schemas.openxmlformats.org/presentationml/2006/main">
+  <p:cSld>
+    <p:spTree>
+      <p:nvGrpSpPr>
+        <p:cNvPr id="1" name=""/>
+        <p:cNvGrpSpPr/>
+        <p:nvPr/>
+      </p:nvGrpSpPr>
+      <p:grpSpPr>
+        <a:xfrm>
+          <a:off x="0" y="0"/>
+          <a:ext cx="0" cy="0"/>
+          <a:chOff x="0" y="0"/>
+          <a:chExt cx="0" cy="0"/>
+        </a:xfrm>
+      </p:grpSpPr>
+      <p:sp>
+        <p:nvSpPr>
+          <p:cNvPr id="2" name="Title 1">
+            <a:extLst>
+              <a:ext uri="{FF2B5EF4-FFF2-40B4-BE49-F238E27FC236}">
+                <a16:creationId xmlns:a16="http://schemas.microsoft.com/office/drawing/2014/main" id="{8B9970EC-88F5-6F41-AC6A-BFE9DB53B82D}"/>
+              </a:ext>
+            </a:extLst>
+          </p:cNvPr>
+          <p:cNvSpPr>
+            <a:spLocks noGrp="1"/>
+          </p:cNvSpPr>
+          <p:nvPr>
+            <p:ph type="title"/>
+          </p:nvPr>
+        </p:nvSpPr>
+        <p:spPr/>
+        <p:txBody>
+          <a:bodyPr/>
+          <a:lstStyle/>
+          <a:p>
+            <a:r>
+              <a:rPr lang="en-US" dirty="0"/>
+              <a:t>After Effects demonstration</a:t>
+            </a:r>
+          </a:p>
+        </p:txBody>
+      </p:sp>
+      <p:sp>
+        <p:nvSpPr>
+          <p:cNvPr id="3" name="Content Placeholder 2">
+            <a:extLst>
+              <a:ext uri="{FF2B5EF4-FFF2-40B4-BE49-F238E27FC236}">
+                <a16:creationId xmlns:a16="http://schemas.microsoft.com/office/drawing/2014/main" id="{14DEE059-64FC-D24B-AF07-17F473784256}"/>
+              </a:ext>
+            </a:extLst>
+          </p:cNvPr>
+          <p:cNvSpPr>
+            <a:spLocks noGrp="1"/>
+          </p:cNvSpPr>
+          <p:nvPr>
+            <p:ph idx="1"/>
+          </p:nvPr>
+        </p:nvSpPr>
+        <p:spPr/>
+        <p:txBody>
+          <a:bodyPr/>
+          <a:lstStyle/>
+          <a:p>
+            <a:r>
+              <a:rPr lang="en-US" dirty="0"/>
+              <a:t>Show how the designer workflow is and how to export (I’ll provide like a 5m video narrated by my designer)</a:t>
+            </a:r>
+          </a:p>
+        </p:txBody>
+      </p:sp>
+    </p:spTree>
+    <p:extLst>
+      <p:ext uri="{BB962C8B-B14F-4D97-AF65-F5344CB8AC3E}">
+        <p14:creationId xmlns:p14="http://schemas.microsoft.com/office/powerpoint/2010/main" val="2553079952"/>
+      </p:ext>
+    </p:extLst>
+  </p:cSld>
+  <p:clrMapOvr>
+    <a:masterClrMapping/>
+  </p:clrMapOvr>
+</p:sld>
+</file>
+
+<file path=ppt/slides/slide14.xml><?xml version="1.0" encoding="utf-8"?>
+<p:sld xmlns:a="http://schemas.openxmlformats.org/drawingml/2006/main" xmlns:r="http://schemas.openxmlformats.org/officeDocument/2006/relationships" xmlns:p="http://schemas.openxmlformats.org/presentationml/2006/main">
+  <p:cSld>
+    <p:spTree>
+      <p:nvGrpSpPr>
+        <p:cNvPr id="1" name=""/>
+        <p:cNvGrpSpPr/>
+        <p:nvPr/>
+      </p:nvGrpSpPr>
+      <p:grpSpPr>
+        <a:xfrm>
+          <a:off x="0" y="0"/>
+          <a:ext cx="0" cy="0"/>
+          <a:chOff x="0" y="0"/>
+          <a:chExt cx="0" cy="0"/>
+        </a:xfrm>
+      </p:grpSpPr>
+      <p:sp>
+        <p:nvSpPr>
+          <p:cNvPr id="2" name="Title 1">
+            <a:extLst>
+              <a:ext uri="{FF2B5EF4-FFF2-40B4-BE49-F238E27FC236}">
+                <a16:creationId xmlns:a16="http://schemas.microsoft.com/office/drawing/2014/main" id="{9F22C05D-6C88-904D-9795-DF3F11BB3B0B}"/>
+              </a:ext>
+            </a:extLst>
+          </p:cNvPr>
+          <p:cNvSpPr>
+            <a:spLocks noGrp="1"/>
+          </p:cNvSpPr>
+          <p:nvPr>
+            <p:ph type="title"/>
+          </p:nvPr>
+        </p:nvSpPr>
+        <p:spPr/>
+        <p:txBody>
+          <a:bodyPr/>
+          <a:lstStyle/>
+          <a:p>
+            <a:r>
+              <a:rPr lang="en-US" dirty="0" err="1"/>
+              <a:t>MultiPlat</a:t>
+            </a:r>
+            <a:endParaRPr lang="en-US" dirty="0"/>
+          </a:p>
+        </p:txBody>
+      </p:sp>
+      <p:sp>
+        <p:nvSpPr>
+          <p:cNvPr id="3" name="Content Placeholder 2">
+            <a:extLst>
+              <a:ext uri="{FF2B5EF4-FFF2-40B4-BE49-F238E27FC236}">
+                <a16:creationId xmlns:a16="http://schemas.microsoft.com/office/drawing/2014/main" id="{0E961F4C-4437-1841-8378-85CA3B3665A2}"/>
+              </a:ext>
+            </a:extLst>
+          </p:cNvPr>
+          <p:cNvSpPr>
+            <a:spLocks noGrp="1"/>
+          </p:cNvSpPr>
+          <p:nvPr>
+            <p:ph idx="1"/>
+          </p:nvPr>
+        </p:nvSpPr>
+        <p:spPr/>
+        <p:txBody>
+          <a:bodyPr/>
+          <a:lstStyle/>
+          <a:p>
+            <a:r>
+              <a:rPr lang="en-US" dirty="0"/>
+              <a:t>Show the </a:t>
+            </a:r>
+            <a:r>
+              <a:rPr lang="en-US" dirty="0" err="1"/>
+              <a:t>Xamarin.iOS</a:t>
+            </a:r>
+            <a:r>
+              <a:rPr lang="en-US" dirty="0"/>
+              <a:t> and </a:t>
+            </a:r>
+            <a:r>
+              <a:rPr lang="en-US" dirty="0" err="1"/>
+              <a:t>Xamarin.Android</a:t>
+            </a:r>
+            <a:r>
+              <a:rPr lang="en-US" dirty="0"/>
+              <a:t> stuff</a:t>
+            </a:r>
+          </a:p>
+        </p:txBody>
+      </p:sp>
+    </p:spTree>
+    <p:extLst>
+      <p:ext uri="{BB962C8B-B14F-4D97-AF65-F5344CB8AC3E}">
+        <p14:creationId xmlns:p14="http://schemas.microsoft.com/office/powerpoint/2010/main" val="2484938975"/>
+      </p:ext>
+    </p:extLst>
+  </p:cSld>
+  <p:clrMapOvr>
+    <a:masterClrMapping/>
+  </p:clrMapOvr>
+</p:sld>
+</file>
+
+<file path=ppt/slides/slide15.xml><?xml version="1.0" encoding="utf-8"?>
+<p:sld xmlns:a="http://schemas.openxmlformats.org/drawingml/2006/main" xmlns:r="http://schemas.openxmlformats.org/officeDocument/2006/relationships" xmlns:p="http://schemas.openxmlformats.org/presentationml/2006/main">
+  <p:cSld>
+    <p:spTree>
+      <p:nvGrpSpPr>
+        <p:cNvPr id="1" name=""/>
+        <p:cNvGrpSpPr/>
+        <p:nvPr/>
+      </p:nvGrpSpPr>
+      <p:grpSpPr>
+        <a:xfrm>
+          <a:off x="0" y="0"/>
+          <a:ext cx="0" cy="0"/>
+          <a:chOff x="0" y="0"/>
+          <a:chExt cx="0" cy="0"/>
+        </a:xfrm>
+      </p:grpSpPr>
+      <p:sp>
+        <p:nvSpPr>
+          <p:cNvPr id="2" name="Title 1">
+            <a:extLst>
+              <a:ext uri="{FF2B5EF4-FFF2-40B4-BE49-F238E27FC236}">
                 <a16:creationId xmlns:a16="http://schemas.microsoft.com/office/drawing/2014/main" id="{0208F002-C6E6-8444-B3BD-1D5905BEA86B}"/>
               </a:ext>
             </a:extLst>
@@ -5734,7 +6034,7 @@
 </p:sld>
 </file>
 
-<file path=ppt/slides/slide13.xml><?xml version="1.0" encoding="utf-8"?>
+<file path=ppt/slides/slide16.xml><?xml version="1.0" encoding="utf-8"?>
 <p:sld xmlns:a="http://schemas.openxmlformats.org/drawingml/2006/main" xmlns:r="http://schemas.openxmlformats.org/officeDocument/2006/relationships" xmlns:p="http://schemas.openxmlformats.org/presentationml/2006/main">
   <p:cSld>
     <p:spTree>
@@ -5864,7 +6164,7 @@
           <a:p>
             <a:r>
               <a:rPr lang="en-US" dirty="0"/>
-              <a:t>What is Lottie</a:t>
+              <a:t>What is Lottie?</a:t>
             </a:r>
           </a:p>
         </p:txBody>
@@ -5885,28 +6185,33 @@
             <p:ph idx="1"/>
           </p:nvPr>
         </p:nvSpPr>
-        <p:spPr/>
-        <p:txBody>
-          <a:bodyPr/>
-          <a:lstStyle/>
-          <a:p>
-            <a:r>
-              <a:rPr lang="en-US" dirty="0"/>
-              <a:t>Talk about history, </a:t>
-            </a:r>
-            <a:r>
-              <a:rPr lang="en-US" dirty="0" err="1"/>
-              <a:t>AirBnB</a:t>
-            </a:r>
-            <a:r>
-              <a:rPr lang="en-US" dirty="0"/>
-              <a:t>, usage, etc.</a:t>
-            </a:r>
-          </a:p>
-          <a:p>
-            <a:r>
-              <a:rPr lang="en-US" dirty="0"/>
-              <a:t>Talk about how it works on all platforms identical</a:t>
+        <p:spPr>
+          <a:xfrm>
+            <a:off x="818712" y="2222287"/>
+            <a:ext cx="10554574" cy="4236879"/>
+          </a:xfrm>
+        </p:spPr>
+        <p:txBody>
+          <a:bodyPr>
+            <a:normAutofit/>
+          </a:bodyPr>
+          <a:lstStyle/>
+          <a:p>
+            <a:r>
+              <a:rPr lang="en-US" sz="2400" dirty="0"/>
+              <a:t>Lottie is a light weight iOS, Android, and React Native library that makes it easy to add high quality animation to any app. </a:t>
+            </a:r>
+          </a:p>
+          <a:p>
+            <a:r>
+              <a:rPr lang="en-US" sz="2400" dirty="0"/>
+              <a:t>The library renders After Effects animations in real time, allowing apps to use animations as easily as they use static images.</a:t>
+            </a:r>
+          </a:p>
+          <a:p>
+            <a:r>
+              <a:rPr lang="en-US" sz="2400" dirty="0"/>
+              <a:t>Lottie provides a flexible animation format that is playable on multiple platforms - Web, iOS and Android, thus enabling companies to provide a uniform UX and UI.</a:t>
             </a:r>
           </a:p>
         </p:txBody>
@@ -5985,36 +6290,68 @@
             <p:ph idx="1"/>
           </p:nvPr>
         </p:nvSpPr>
-        <p:spPr/>
-        <p:txBody>
-          <a:bodyPr/>
-          <a:lstStyle/>
-          <a:p>
-            <a:r>
-              <a:rPr lang="en-US" dirty="0"/>
-              <a:t>Talk about vector animation stuff.  </a:t>
-            </a:r>
-          </a:p>
-          <a:p>
-            <a:r>
-              <a:rPr lang="en-US" dirty="0"/>
-              <a:t>Highlight the features </a:t>
-            </a:r>
-            <a:r>
-              <a:rPr lang="en-US" dirty="0" err="1"/>
-              <a:t>Lotie</a:t>
-            </a:r>
-            <a:r>
-              <a:rPr lang="en-US" dirty="0"/>
-              <a:t> does and does not support (as far as </a:t>
-            </a:r>
-            <a:r>
-              <a:rPr lang="en-US" dirty="0" err="1"/>
-              <a:t>AfterEffect</a:t>
-            </a:r>
-            <a:r>
-              <a:rPr lang="en-US" dirty="0"/>
-              <a:t> / Haiku export)</a:t>
+        <p:spPr>
+          <a:xfrm>
+            <a:off x="818712" y="2222287"/>
+            <a:ext cx="10554574" cy="4373066"/>
+          </a:xfrm>
+        </p:spPr>
+        <p:txBody>
+          <a:bodyPr>
+            <a:normAutofit/>
+          </a:bodyPr>
+          <a:lstStyle/>
+          <a:p>
+            <a:r>
+              <a:rPr lang="en-US" dirty="0"/>
+              <a:t>Like SVGs, Lottie is a vector-based JSON format.</a:t>
+            </a:r>
+          </a:p>
+          <a:p>
+            <a:pPr lvl="1"/>
+            <a:r>
+              <a:rPr lang="en-US" dirty="0"/>
+              <a:t>This means that the file is very small compared to traditional imagery and frame data.</a:t>
+            </a:r>
+          </a:p>
+          <a:p>
+            <a:r>
+              <a:rPr lang="en-US" dirty="0"/>
+              <a:t>Since this is vector-based…</a:t>
+            </a:r>
+          </a:p>
+          <a:p>
+            <a:pPr lvl="1"/>
+            <a:r>
+              <a:rPr lang="en-US" dirty="0"/>
+              <a:t>It means that there is no dependent resolution and that scaling will be clean and aliased, no matter the device.</a:t>
+            </a:r>
+          </a:p>
+          <a:p>
+            <a:pPr lvl="1"/>
+            <a:r>
+              <a:rPr lang="en-US" dirty="0"/>
+              <a:t>It means that there is no platform dependencies or interaction model to be accounted for in the design process.</a:t>
+            </a:r>
+          </a:p>
+          <a:p>
+            <a:r>
+              <a:rPr lang="en-US" dirty="0"/>
+              <a:t>There are some caveats though:</a:t>
+            </a:r>
+          </a:p>
+          <a:p>
+            <a:pPr lvl="1"/>
+            <a:r>
+              <a:rPr lang="en-US" dirty="0"/>
+              <a:t>Certain types of After Effects features are not supported (merge shapes, alpha inverted masks, 3d, etc.)</a:t>
+            </a:r>
+          </a:p>
+          <a:p>
+            <a:pPr lvl="1"/>
+            <a:r>
+              <a:rPr lang="en-US" dirty="0"/>
+              <a:t>Certain types of vector elements are not supported (like mask gradients, layer blend modes, etc.)</a:t>
             </a:r>
           </a:p>
         </p:txBody>
@@ -6054,7 +6391,7 @@
           <p:cNvPr id="2" name="Title 1">
             <a:extLst>
               <a:ext uri="{FF2B5EF4-FFF2-40B4-BE49-F238E27FC236}">
-                <a16:creationId xmlns:a16="http://schemas.microsoft.com/office/drawing/2014/main" id="{EF4A39BF-E1B7-D648-96D2-40BD418DDA3E}"/>
+                <a16:creationId xmlns:a16="http://schemas.microsoft.com/office/drawing/2014/main" id="{BB4CFABB-9AD0-FB44-97A3-91DA8806BCEB}"/>
               </a:ext>
             </a:extLst>
           </p:cNvPr>
@@ -6072,7 +6409,7 @@
           <a:p>
             <a:r>
               <a:rPr lang="en-US" dirty="0"/>
-              <a:t>Lottie JSON Rundown</a:t>
+              <a:t>Demo time!</a:t>
             </a:r>
           </a:p>
         </p:txBody>
@@ -6082,7 +6419,7 @@
           <p:cNvPr id="3" name="Content Placeholder 2">
             <a:extLst>
               <a:ext uri="{FF2B5EF4-FFF2-40B4-BE49-F238E27FC236}">
-                <a16:creationId xmlns:a16="http://schemas.microsoft.com/office/drawing/2014/main" id="{EED92DA5-6410-AB46-956A-73580F4C02DA}"/>
+                <a16:creationId xmlns:a16="http://schemas.microsoft.com/office/drawing/2014/main" id="{A22FE8FE-9EEF-D740-8C92-D912B720BE19}"/>
               </a:ext>
             </a:extLst>
           </p:cNvPr>
@@ -6100,13 +6437,27 @@
           <a:p>
             <a:r>
               <a:rPr lang="en-US" dirty="0"/>
-              <a:t>Talk about how the JSON is made.</a:t>
-            </a:r>
-          </a:p>
-          <a:p>
-            <a:r>
-              <a:rPr lang="en-US" dirty="0"/>
-              <a:t>Talk about can load from Bundle or URL.</a:t>
+              <a:t>You can load a Lottie animation from a packaged </a:t>
+            </a:r>
+            <a:r>
+              <a:rPr lang="en-US" dirty="0" err="1"/>
+              <a:t>anim</a:t>
+            </a:r>
+            <a:r>
+              <a:rPr lang="en-US" dirty="0"/>
+              <a:t> in the bundle</a:t>
+            </a:r>
+          </a:p>
+          <a:p>
+            <a:r>
+              <a:rPr lang="en-US" dirty="0"/>
+              <a:t>You can also load the animation from a URL!</a:t>
+            </a:r>
+          </a:p>
+          <a:p>
+            <a:r>
+              <a:rPr lang="en-US" dirty="0"/>
+              <a:t>(show off the simulator here)</a:t>
             </a:r>
           </a:p>
         </p:txBody>
@@ -6114,7 +6465,7 @@
     </p:spTree>
     <p:extLst>
       <p:ext uri="{BB962C8B-B14F-4D97-AF65-F5344CB8AC3E}">
-        <p14:creationId xmlns:p14="http://schemas.microsoft.com/office/powerpoint/2010/main" val="2750027757"/>
+        <p14:creationId xmlns:p14="http://schemas.microsoft.com/office/powerpoint/2010/main" val="2599751641"/>
       </p:ext>
     </p:extLst>
   </p:cSld>
@@ -6146,7 +6497,7 @@
           <p:cNvPr id="2" name="Title 1">
             <a:extLst>
               <a:ext uri="{FF2B5EF4-FFF2-40B4-BE49-F238E27FC236}">
-                <a16:creationId xmlns:a16="http://schemas.microsoft.com/office/drawing/2014/main" id="{D75C75AE-0216-8742-98F6-D738D2C1806E}"/>
+                <a16:creationId xmlns:a16="http://schemas.microsoft.com/office/drawing/2014/main" id="{A3FB42D4-2247-1D44-9966-C1DB4492263E}"/>
               </a:ext>
             </a:extLst>
           </p:cNvPr>
@@ -6164,7 +6515,7 @@
           <a:p>
             <a:r>
               <a:rPr lang="en-US" dirty="0"/>
-              <a:t>Implementation Description</a:t>
+              <a:t>JSON Peek-a-boo</a:t>
             </a:r>
           </a:p>
         </p:txBody>
@@ -6174,7 +6525,7 @@
           <p:cNvPr id="3" name="Content Placeholder 2">
             <a:extLst>
               <a:ext uri="{FF2B5EF4-FFF2-40B4-BE49-F238E27FC236}">
-                <a16:creationId xmlns:a16="http://schemas.microsoft.com/office/drawing/2014/main" id="{43DFD77F-E2D6-2B41-9DDA-7CD63416AB70}"/>
+                <a16:creationId xmlns:a16="http://schemas.microsoft.com/office/drawing/2014/main" id="{14AA2BBF-3721-AE41-AE55-5B95669091B8}"/>
               </a:ext>
             </a:extLst>
           </p:cNvPr>
@@ -6185,28 +6536,101 @@
             <p:ph idx="1"/>
           </p:nvPr>
         </p:nvSpPr>
-        <p:spPr/>
-        <p:txBody>
-          <a:bodyPr/>
-          <a:lstStyle/>
-          <a:p>
-            <a:r>
-              <a:rPr lang="en-US" dirty="0"/>
-              <a:t>Talk about high-level SDK and the classes you can use.</a:t>
-            </a:r>
-          </a:p>
-          <a:p>
-            <a:r>
-              <a:rPr lang="en-US" dirty="0"/>
-              <a:t>Show some code.</a:t>
-            </a:r>
-          </a:p>
-        </p:txBody>
-      </p:sp>
+        <p:spPr>
+          <a:xfrm>
+            <a:off x="818712" y="2222287"/>
+            <a:ext cx="4358769" cy="3636511"/>
+          </a:xfrm>
+        </p:spPr>
+        <p:txBody>
+          <a:bodyPr/>
+          <a:lstStyle/>
+          <a:p>
+            <a:r>
+              <a:rPr lang="en-US" dirty="0"/>
+              <a:t>Frame Rate, Version, Width, Height, Layers, etc.</a:t>
+            </a:r>
+          </a:p>
+          <a:p>
+            <a:r>
+              <a:rPr lang="en-US" dirty="0"/>
+              <a:t>Otherwise, </a:t>
+            </a:r>
+            <a:r>
+              <a:rPr lang="en-US" dirty="0" err="1"/>
+              <a:t>minify’d</a:t>
+            </a:r>
+            <a:r>
+              <a:rPr lang="en-US" dirty="0"/>
+              <a:t> unreadable values to be used dynamically by executing code</a:t>
+            </a:r>
+          </a:p>
+        </p:txBody>
+      </p:sp>
+      <p:pic>
+        <p:nvPicPr>
+          <p:cNvPr id="4" name="Picture 3">
+            <a:extLst>
+              <a:ext uri="{FF2B5EF4-FFF2-40B4-BE49-F238E27FC236}">
+                <a16:creationId xmlns:a16="http://schemas.microsoft.com/office/drawing/2014/main" id="{2B66BBFF-07CC-7F4B-A93E-43AEAFFC0D68}"/>
+              </a:ext>
+            </a:extLst>
+          </p:cNvPr>
+          <p:cNvPicPr>
+            <a:picLocks noChangeAspect="1"/>
+          </p:cNvPicPr>
+          <p:nvPr/>
+        </p:nvPicPr>
+        <p:blipFill>
+          <a:blip r:embed="rId2"/>
+          <a:stretch>
+            <a:fillRect/>
+          </a:stretch>
+        </p:blipFill>
+        <p:spPr>
+          <a:xfrm>
+            <a:off x="4946265" y="1974813"/>
+            <a:ext cx="3390900" cy="4165600"/>
+          </a:xfrm>
+          <a:prstGeom prst="rect">
+            <a:avLst/>
+          </a:prstGeom>
+        </p:spPr>
+      </p:pic>
+      <p:pic>
+        <p:nvPicPr>
+          <p:cNvPr id="5" name="Picture 4">
+            <a:extLst>
+              <a:ext uri="{FF2B5EF4-FFF2-40B4-BE49-F238E27FC236}">
+                <a16:creationId xmlns:a16="http://schemas.microsoft.com/office/drawing/2014/main" id="{F3884613-F34C-D841-9E8A-039D7C0935E7}"/>
+              </a:ext>
+            </a:extLst>
+          </p:cNvPr>
+          <p:cNvPicPr>
+            <a:picLocks noChangeAspect="1"/>
+          </p:cNvPicPr>
+          <p:nvPr/>
+        </p:nvPicPr>
+        <p:blipFill>
+          <a:blip r:embed="rId3"/>
+          <a:stretch>
+            <a:fillRect/>
+          </a:stretch>
+        </p:blipFill>
+        <p:spPr>
+          <a:xfrm>
+            <a:off x="8398950" y="343326"/>
+            <a:ext cx="3664291" cy="6354262"/>
+          </a:xfrm>
+          <a:prstGeom prst="rect">
+            <a:avLst/>
+          </a:prstGeom>
+        </p:spPr>
+      </p:pic>
     </p:spTree>
     <p:extLst>
       <p:ext uri="{BB962C8B-B14F-4D97-AF65-F5344CB8AC3E}">
-        <p14:creationId xmlns:p14="http://schemas.microsoft.com/office/powerpoint/2010/main" val="1760326667"/>
+        <p14:creationId xmlns:p14="http://schemas.microsoft.com/office/powerpoint/2010/main" val="3215508051"/>
       </p:ext>
     </p:extLst>
   </p:cSld>
@@ -6238,7 +6662,7 @@
           <p:cNvPr id="2" name="Title 1">
             <a:extLst>
               <a:ext uri="{FF2B5EF4-FFF2-40B4-BE49-F238E27FC236}">
-                <a16:creationId xmlns:a16="http://schemas.microsoft.com/office/drawing/2014/main" id="{0930852D-7ECC-854D-9FC2-3719AB64CE6A}"/>
+                <a16:creationId xmlns:a16="http://schemas.microsoft.com/office/drawing/2014/main" id="{EF4A39BF-E1B7-D648-96D2-40BD418DDA3E}"/>
               </a:ext>
             </a:extLst>
           </p:cNvPr>
@@ -6249,14 +6673,26 @@
             <p:ph type="title"/>
           </p:nvPr>
         </p:nvSpPr>
-        <p:spPr/>
-        <p:txBody>
-          <a:bodyPr/>
-          <a:lstStyle/>
-          <a:p>
-            <a:r>
-              <a:rPr lang="en-US" dirty="0"/>
-              <a:t>View Hierarchy</a:t>
+        <p:spPr>
+          <a:xfrm>
+            <a:off x="377513" y="580768"/>
+            <a:ext cx="10571998" cy="970450"/>
+          </a:xfrm>
+        </p:spPr>
+        <p:txBody>
+          <a:bodyPr/>
+          <a:lstStyle/>
+          <a:p>
+            <a:r>
+              <a:rPr lang="en-US" dirty="0"/>
+              <a:t>JSON </a:t>
+            </a:r>
+            <a:br>
+              <a:rPr lang="en-US" dirty="0"/>
+            </a:br>
+            <a:r>
+              <a:rPr lang="en-US" dirty="0"/>
+              <a:t>Rundown</a:t>
             </a:r>
           </a:p>
         </p:txBody>
@@ -6266,7 +6702,7 @@
           <p:cNvPr id="3" name="Content Placeholder 2">
             <a:extLst>
               <a:ext uri="{FF2B5EF4-FFF2-40B4-BE49-F238E27FC236}">
-                <a16:creationId xmlns:a16="http://schemas.microsoft.com/office/drawing/2014/main" id="{2BF035E4-7FFD-6B46-86D5-668F436D58F1}"/>
+                <a16:creationId xmlns:a16="http://schemas.microsoft.com/office/drawing/2014/main" id="{EED92DA5-6410-AB46-956A-73580F4C02DA}"/>
               </a:ext>
             </a:extLst>
           </p:cNvPr>
@@ -6277,50 +6713,76 @@
             <p:ph idx="1"/>
           </p:nvPr>
         </p:nvSpPr>
-        <p:spPr/>
-        <p:txBody>
-          <a:bodyPr/>
-          <a:lstStyle/>
-          <a:p>
-            <a:r>
-              <a:rPr lang="en-US" dirty="0"/>
-              <a:t>Show how </a:t>
-            </a:r>
-            <a:r>
-              <a:rPr lang="en-US" dirty="0" err="1"/>
-              <a:t>LottieAnimationView</a:t>
-            </a:r>
-            <a:r>
-              <a:rPr lang="en-US" dirty="0"/>
-              <a:t> needs to be used programmatically and is usually layered under another control</a:t>
-            </a:r>
-          </a:p>
-          <a:p>
-            <a:r>
-              <a:rPr lang="en-US" dirty="0"/>
-              <a:t>Show </a:t>
-            </a:r>
-            <a:r>
-              <a:rPr lang="en-US" dirty="0" err="1"/>
-              <a:t>LOTCheckBox</a:t>
-            </a:r>
-            <a:r>
-              <a:rPr lang="en-US" dirty="0"/>
-              <a:t> on iOS</a:t>
-            </a:r>
-          </a:p>
-          <a:p>
-            <a:pPr marL="0" indent="0">
-              <a:buNone/>
-            </a:pPr>
-            <a:endParaRPr lang="en-US" dirty="0"/>
-          </a:p>
-        </p:txBody>
-      </p:sp>
+        <p:spPr>
+          <a:xfrm>
+            <a:off x="0" y="4640691"/>
+            <a:ext cx="10475364" cy="2201432"/>
+          </a:xfrm>
+        </p:spPr>
+        <p:txBody>
+          <a:bodyPr/>
+          <a:lstStyle/>
+          <a:p>
+            <a:r>
+              <a:rPr lang="en-US" dirty="0"/>
+              <a:t>The JSON for a Lottie animation can be exported directly from After Effects</a:t>
+            </a:r>
+          </a:p>
+          <a:p>
+            <a:r>
+              <a:rPr lang="en-US" dirty="0"/>
+              <a:t>It can also be made by creating assets in Sketch, importing to Haiku, then exporting to the Lottie JSON with a plugin.</a:t>
+            </a:r>
+          </a:p>
+          <a:p>
+            <a:pPr lvl="1"/>
+            <a:r>
+              <a:rPr lang="en-US" dirty="0">
+                <a:hlinkClick r:id="rId2"/>
+              </a:rPr>
+              <a:t>www.haiku.ai</a:t>
+            </a:r>
+            <a:r>
+              <a:rPr lang="en-US" dirty="0"/>
+              <a:t> </a:t>
+            </a:r>
+          </a:p>
+        </p:txBody>
+      </p:sp>
+      <p:pic>
+        <p:nvPicPr>
+          <p:cNvPr id="4" name="Picture 3">
+            <a:extLst>
+              <a:ext uri="{FF2B5EF4-FFF2-40B4-BE49-F238E27FC236}">
+                <a16:creationId xmlns:a16="http://schemas.microsoft.com/office/drawing/2014/main" id="{A00FB3F8-6270-8A44-8551-F17402439D86}"/>
+              </a:ext>
+            </a:extLst>
+          </p:cNvPr>
+          <p:cNvPicPr>
+            <a:picLocks noChangeAspect="1"/>
+          </p:cNvPicPr>
+          <p:nvPr/>
+        </p:nvPicPr>
+        <p:blipFill>
+          <a:blip r:embed="rId3"/>
+          <a:stretch>
+            <a:fillRect/>
+          </a:stretch>
+        </p:blipFill>
+        <p:spPr>
+          <a:xfrm>
+            <a:off x="3583459" y="-135926"/>
+            <a:ext cx="8866167" cy="5289025"/>
+          </a:xfrm>
+          <a:prstGeom prst="rect">
+            <a:avLst/>
+          </a:prstGeom>
+        </p:spPr>
+      </p:pic>
     </p:spTree>
     <p:extLst>
       <p:ext uri="{BB962C8B-B14F-4D97-AF65-F5344CB8AC3E}">
-        <p14:creationId xmlns:p14="http://schemas.microsoft.com/office/powerpoint/2010/main" val="3883428286"/>
+        <p14:creationId xmlns:p14="http://schemas.microsoft.com/office/powerpoint/2010/main" val="2750027757"/>
       </p:ext>
     </p:extLst>
   </p:cSld>
@@ -6352,7 +6814,7 @@
           <p:cNvPr id="2" name="Title 1">
             <a:extLst>
               <a:ext uri="{FF2B5EF4-FFF2-40B4-BE49-F238E27FC236}">
-                <a16:creationId xmlns:a16="http://schemas.microsoft.com/office/drawing/2014/main" id="{B2BC51A3-59A3-1248-8ADD-32DE10087C83}"/>
+                <a16:creationId xmlns:a16="http://schemas.microsoft.com/office/drawing/2014/main" id="{C2A7B8B2-A3FD-DA49-B38F-33700BCBF7E5}"/>
               </a:ext>
             </a:extLst>
           </p:cNvPr>
@@ -6369,10 +6831,9 @@
           <a:lstStyle/>
           <a:p>
             <a:r>
-              <a:rPr lang="en-US" dirty="0" err="1"/>
-              <a:t>LottieFiles.com</a:t>
-            </a:r>
-            <a:endParaRPr lang="en-US" dirty="0"/>
+              <a:rPr lang="en-US" dirty="0"/>
+              <a:t>From the Designer’s Desk…</a:t>
+            </a:r>
           </a:p>
         </p:txBody>
       </p:sp>
@@ -6381,7 +6842,7 @@
           <p:cNvPr id="3" name="Content Placeholder 2">
             <a:extLst>
               <a:ext uri="{FF2B5EF4-FFF2-40B4-BE49-F238E27FC236}">
-                <a16:creationId xmlns:a16="http://schemas.microsoft.com/office/drawing/2014/main" id="{1E9584BD-2512-D143-AC12-F46B728C7C8C}"/>
+                <a16:creationId xmlns:a16="http://schemas.microsoft.com/office/drawing/2014/main" id="{AB4733B4-AD0E-6448-94B6-247D984A588F}"/>
               </a:ext>
             </a:extLst>
           </p:cNvPr>
@@ -6399,15 +6860,45 @@
           <a:p>
             <a:r>
               <a:rPr lang="en-US" dirty="0"/>
-              <a:t>Show all the cool </a:t>
+              <a:t>A 6 minute presentation by </a:t>
             </a:r>
             <a:r>
               <a:rPr lang="en-US" dirty="0" err="1"/>
-              <a:t>anims</a:t>
-            </a:r>
-            <a:r>
-              <a:rPr lang="en-US" dirty="0"/>
-              <a:t> you can use for free, lead into demo</a:t>
+              <a:t>MyStrength’s</a:t>
+            </a:r>
+            <a:r>
+              <a:rPr lang="en-US" dirty="0"/>
+              <a:t> </a:t>
+            </a:r>
+            <a:r>
+              <a:rPr lang="en-US"/>
+              <a:t>Creative Director, </a:t>
+            </a:r>
+            <a:r>
+              <a:rPr lang="en-US" b="1"/>
+              <a:t>Derek Balmer</a:t>
+            </a:r>
+            <a:r>
+              <a:rPr lang="en-US"/>
+              <a:t>,  </a:t>
+            </a:r>
+            <a:r>
+              <a:rPr lang="en-US" dirty="0"/>
+              <a:t>about how he made a checkmark </a:t>
+            </a:r>
+            <a:r>
+              <a:rPr lang="en-US" dirty="0" err="1"/>
+              <a:t>anim</a:t>
+            </a:r>
+            <a:r>
+              <a:rPr lang="en-US" dirty="0"/>
+              <a:t> for our app using Sketch -&gt; Haiku -&gt; Lottie</a:t>
+            </a:r>
+          </a:p>
+          <a:p>
+            <a:r>
+              <a:rPr lang="en-US" dirty="0"/>
+              <a:t>(play video!)</a:t>
             </a:r>
           </a:p>
         </p:txBody>
@@ -6415,7 +6906,7 @@
     </p:spTree>
     <p:extLst>
       <p:ext uri="{BB962C8B-B14F-4D97-AF65-F5344CB8AC3E}">
-        <p14:creationId xmlns:p14="http://schemas.microsoft.com/office/powerpoint/2010/main" val="3992220478"/>
+        <p14:creationId xmlns:p14="http://schemas.microsoft.com/office/powerpoint/2010/main" val="1663354735"/>
       </p:ext>
     </p:extLst>
   </p:cSld>
@@ -6447,7 +6938,7 @@
           <p:cNvPr id="2" name="Title 1">
             <a:extLst>
               <a:ext uri="{FF2B5EF4-FFF2-40B4-BE49-F238E27FC236}">
-                <a16:creationId xmlns:a16="http://schemas.microsoft.com/office/drawing/2014/main" id="{22CD9F90-8D25-8446-82C1-122E31FCE7C8}"/>
+                <a16:creationId xmlns:a16="http://schemas.microsoft.com/office/drawing/2014/main" id="{D75C75AE-0216-8742-98F6-D738D2C1806E}"/>
               </a:ext>
             </a:extLst>
           </p:cNvPr>
@@ -6465,7 +6956,7 @@
           <a:p>
             <a:r>
               <a:rPr lang="en-US" dirty="0"/>
-              <a:t>Demo</a:t>
+              <a:t>Implementation Description</a:t>
             </a:r>
           </a:p>
         </p:txBody>
@@ -6475,7 +6966,7 @@
           <p:cNvPr id="3" name="Content Placeholder 2">
             <a:extLst>
               <a:ext uri="{FF2B5EF4-FFF2-40B4-BE49-F238E27FC236}">
-                <a16:creationId xmlns:a16="http://schemas.microsoft.com/office/drawing/2014/main" id="{C08951B8-8818-1F45-B5C3-F37F80C3BF1E}"/>
+                <a16:creationId xmlns:a16="http://schemas.microsoft.com/office/drawing/2014/main" id="{43DFD77F-E2D6-2B41-9DDA-7CD63416AB70}"/>
               </a:ext>
             </a:extLst>
           </p:cNvPr>
@@ -6493,32 +6984,13 @@
           <a:p>
             <a:r>
               <a:rPr lang="en-US" dirty="0"/>
-              <a:t>Show web </a:t>
-            </a:r>
-            <a:r>
-              <a:rPr lang="en-US" dirty="0" err="1"/>
-              <a:t>anim</a:t>
-            </a:r>
-            <a:endParaRPr lang="en-US" dirty="0"/>
-          </a:p>
-          <a:p>
-            <a:r>
-              <a:rPr lang="en-US" dirty="0"/>
-              <a:t>Then show same </a:t>
-            </a:r>
-            <a:r>
-              <a:rPr lang="en-US" dirty="0" err="1"/>
-              <a:t>anim</a:t>
-            </a:r>
-            <a:r>
-              <a:rPr lang="en-US" dirty="0"/>
-              <a:t> loading in a simulator</a:t>
-            </a:r>
-          </a:p>
-          <a:p>
-            <a:r>
-              <a:rPr lang="en-US" dirty="0"/>
-              <a:t>Show loading from URL and from Bundle (code next to simulator open)</a:t>
+              <a:t>Talk about high-level SDK and the classes you can use.</a:t>
+            </a:r>
+          </a:p>
+          <a:p>
+            <a:r>
+              <a:rPr lang="en-US" dirty="0"/>
+              <a:t>Show some code.</a:t>
             </a:r>
           </a:p>
         </p:txBody>
@@ -6526,7 +6998,7 @@
     </p:spTree>
     <p:extLst>
       <p:ext uri="{BB962C8B-B14F-4D97-AF65-F5344CB8AC3E}">
-        <p14:creationId xmlns:p14="http://schemas.microsoft.com/office/powerpoint/2010/main" val="4099766690"/>
+        <p14:creationId xmlns:p14="http://schemas.microsoft.com/office/powerpoint/2010/main" val="1760326667"/>
       </p:ext>
     </p:extLst>
   </p:cSld>
@@ -6558,7 +7030,7 @@
           <p:cNvPr id="2" name="Title 1">
             <a:extLst>
               <a:ext uri="{FF2B5EF4-FFF2-40B4-BE49-F238E27FC236}">
-                <a16:creationId xmlns:a16="http://schemas.microsoft.com/office/drawing/2014/main" id="{FE0902FC-4496-8640-BD19-242A7877A5C8}"/>
+                <a16:creationId xmlns:a16="http://schemas.microsoft.com/office/drawing/2014/main" id="{0930852D-7ECC-854D-9FC2-3719AB64CE6A}"/>
               </a:ext>
             </a:extLst>
           </p:cNvPr>
@@ -6576,7 +7048,7 @@
           <a:p>
             <a:r>
               <a:rPr lang="en-US" dirty="0"/>
-              <a:t>SDK Advanced</a:t>
+              <a:t>View Hierarchy</a:t>
             </a:r>
           </a:p>
         </p:txBody>
@@ -6586,7 +7058,7 @@
           <p:cNvPr id="3" name="Content Placeholder 2">
             <a:extLst>
               <a:ext uri="{FF2B5EF4-FFF2-40B4-BE49-F238E27FC236}">
-                <a16:creationId xmlns:a16="http://schemas.microsoft.com/office/drawing/2014/main" id="{D79193F6-90C9-E441-A41B-1DF2BF949281}"/>
+                <a16:creationId xmlns:a16="http://schemas.microsoft.com/office/drawing/2014/main" id="{2BF035E4-7FFD-6B46-86D5-668F436D58F1}"/>
               </a:ext>
             </a:extLst>
           </p:cNvPr>
@@ -6604,15 +7076,43 @@
           <a:p>
             <a:r>
               <a:rPr lang="en-US" dirty="0"/>
-              <a:t>Easing, transitions, forward/backward stuff</a:t>
-            </a:r>
+              <a:t>Show how </a:t>
+            </a:r>
+            <a:r>
+              <a:rPr lang="en-US" dirty="0" err="1"/>
+              <a:t>LottieAnimationView</a:t>
+            </a:r>
+            <a:r>
+              <a:rPr lang="en-US" dirty="0"/>
+              <a:t> needs to be used programmatically and is usually layered under another control</a:t>
+            </a:r>
+          </a:p>
+          <a:p>
+            <a:r>
+              <a:rPr lang="en-US" dirty="0"/>
+              <a:t>Show </a:t>
+            </a:r>
+            <a:r>
+              <a:rPr lang="en-US" dirty="0" err="1"/>
+              <a:t>LOTCheckBox</a:t>
+            </a:r>
+            <a:r>
+              <a:rPr lang="en-US" dirty="0"/>
+              <a:t> on iOS</a:t>
+            </a:r>
+          </a:p>
+          <a:p>
+            <a:pPr marL="0" indent="0">
+              <a:buNone/>
+            </a:pPr>
+            <a:endParaRPr lang="en-US" dirty="0"/>
           </a:p>
         </p:txBody>
       </p:sp>
     </p:spTree>
     <p:extLst>
       <p:ext uri="{BB962C8B-B14F-4D97-AF65-F5344CB8AC3E}">
-        <p14:creationId xmlns:p14="http://schemas.microsoft.com/office/powerpoint/2010/main" val="4050406585"/>
+        <p14:creationId xmlns:p14="http://schemas.microsoft.com/office/powerpoint/2010/main" val="3883428286"/>
       </p:ext>
     </p:extLst>
   </p:cSld>

</xml_diff>